<commit_message>
Revert "Mode1 before fo"
</commit_message>
<xml_diff>
--- a/pscopf.pptx
+++ b/pscopf.pptx
@@ -221,7 +221,7 @@
           <a:p>
             <a:fld id="{760854E3-1497-0744-B040-5DF6365302EA}" type="datetimeFigureOut">
               <a:rPr lang="fr-FR" smtClean="0"/>
-              <a:t>17/01/2022</a:t>
+              <a:t>09/12/2021</a:t>
             </a:fld>
             <a:endParaRPr lang="fr-FR"/>
           </a:p>
@@ -387,7 +387,7 @@
           <a:p>
             <a:fld id="{A1E22894-B65C-E342-8D31-57D034836A37}" type="datetimeFigureOut">
               <a:rPr lang="fr-FR" smtClean="0"/>
-              <a:t>17/01/2022</a:t>
+              <a:t>09/12/2021</a:t>
             </a:fld>
             <a:endParaRPr lang="fr-FR"/>
           </a:p>
@@ -4018,7 +4018,7 @@
             </p:spPr>
             <p:txBody>
               <a:bodyPr>
-                <a:normAutofit fontScale="62500" lnSpcReduction="20000"/>
+                <a:normAutofit fontScale="77500" lnSpcReduction="20000"/>
               </a:bodyPr>
               <a:lstStyle/>
               <a:p>
@@ -4366,215 +4366,126 @@
                           </m:mr>
                           <m:mr>
                             <m:e>
-                              <m:eqArr>
-                                <m:eqArrPr>
+                              <m:d>
+                                <m:dPr>
                                   <m:ctrlPr>
-                                    <a:rPr lang="fr-FR" i="1" smtClean="0">
+                                    <a:rPr lang="fr-FR" i="1">
                                       <a:latin typeface="Cambria Math" panose="02040503050406030204" pitchFamily="18" charset="0"/>
                                     </a:rPr>
                                   </m:ctrlPr>
-                                </m:eqArrPr>
+                                </m:dPr>
                                 <m:e>
-                                  <m:d>
-                                    <m:dPr>
-                                      <m:ctrlPr>
-                                        <a:rPr lang="fr-FR" i="1" smtClean="0">
-                                          <a:latin typeface="Cambria Math" panose="02040503050406030204" pitchFamily="18" charset="0"/>
-                                        </a:rPr>
-                                      </m:ctrlPr>
-                                    </m:dPr>
-                                    <m:e>
-                                      <m:sSub>
-                                        <m:sSubPr>
-                                          <m:ctrlPr>
-                                            <a:rPr lang="fr-FR" i="1">
-                                              <a:latin typeface="Cambria Math" panose="02040503050406030204" pitchFamily="18" charset="0"/>
-                                            </a:rPr>
-                                          </m:ctrlPr>
-                                        </m:sSubPr>
-                                        <m:e>
-                                          <m:r>
-                                            <a:rPr lang="fr-FR" i="1">
-                                              <a:latin typeface="Cambria Math" panose="02040503050406030204" pitchFamily="18" charset="0"/>
-                                            </a:rPr>
-                                            <m:t>𝑥</m:t>
-                                          </m:r>
-                                        </m:e>
-                                        <m:sub>
-                                          <m:r>
-                                            <a:rPr lang="fr-FR" i="1">
-                                              <a:latin typeface="Cambria Math" panose="02040503050406030204" pitchFamily="18" charset="0"/>
-                                            </a:rPr>
-                                            <m:t>𝐼𝑁</m:t>
-                                          </m:r>
-                                        </m:sub>
-                                      </m:sSub>
-                                    </m:e>
-                                  </m:d>
-                                  <m:r>
-                                    <a:rPr lang="fr-FR" i="1">
-                                      <a:latin typeface="Cambria Math" panose="02040503050406030204" pitchFamily="18" charset="0"/>
-                                    </a:rPr>
-                                    <m:t>⋅</m:t>
-                                  </m:r>
-                                  <m:r>
-                                    <a:rPr lang="fr-FR" i="1" smtClean="0">
-                                      <a:solidFill>
-                                        <a:schemeClr val="tx1"/>
-                                      </a:solidFill>
-                                      <a:latin typeface="Cambria Math" panose="02040503050406030204" pitchFamily="18" charset="0"/>
-                                    </a:rPr>
-                                    <m:t>𝑝𝑀𝑎𝑥</m:t>
-                                  </m:r>
-                                  <m:r>
-                                    <a:rPr lang="fr-FR" b="0" i="1" smtClean="0">
-                                      <a:solidFill>
-                                        <a:schemeClr val="tx1"/>
-                                      </a:solidFill>
-                                      <a:latin typeface="Cambria Math" panose="02040503050406030204" pitchFamily="18" charset="0"/>
-                                    </a:rPr>
-                                    <m:t>+</m:t>
-                                  </m:r>
-                                  <m:d>
-                                    <m:dPr>
-                                      <m:ctrlPr>
-                                        <a:rPr lang="fr-FR" i="1">
-                                          <a:solidFill>
-                                            <a:schemeClr val="tx1"/>
-                                          </a:solidFill>
-                                          <a:latin typeface="Cambria Math" panose="02040503050406030204" pitchFamily="18" charset="0"/>
-                                        </a:rPr>
-                                      </m:ctrlPr>
-                                    </m:dPr>
-                                    <m:e>
-                                      <m:sSub>
-                                        <m:sSubPr>
-                                          <m:ctrlPr>
-                                            <a:rPr lang="fr-FR" i="1">
-                                              <a:solidFill>
-                                                <a:schemeClr val="tx1"/>
-                                              </a:solidFill>
-                                              <a:latin typeface="Cambria Math" panose="02040503050406030204" pitchFamily="18" charset="0"/>
-                                            </a:rPr>
-                                          </m:ctrlPr>
-                                        </m:sSubPr>
-                                        <m:e>
-                                          <m:r>
-                                            <a:rPr lang="fr-FR" i="1">
-                                              <a:solidFill>
-                                                <a:schemeClr val="tx1"/>
-                                              </a:solidFill>
-                                              <a:latin typeface="Cambria Math" panose="02040503050406030204" pitchFamily="18" charset="0"/>
-                                            </a:rPr>
-                                            <m:t>𝑥</m:t>
-                                          </m:r>
-                                        </m:e>
-                                        <m:sub>
-                                          <m:r>
-                                            <a:rPr lang="fr-FR" i="1">
-                                              <a:solidFill>
-                                                <a:schemeClr val="tx1"/>
-                                              </a:solidFill>
-                                              <a:latin typeface="Cambria Math" panose="02040503050406030204" pitchFamily="18" charset="0"/>
-                                            </a:rPr>
-                                            <m:t>𝑀𝐴𝑅𝐺𝐼𝑁𝐴𝐿</m:t>
-                                          </m:r>
-                                        </m:sub>
-                                      </m:sSub>
-                                    </m:e>
-                                  </m:d>
-                                  <m:r>
-                                    <a:rPr lang="fr-FR" i="1">
-                                      <a:solidFill>
-                                        <a:schemeClr val="tx1"/>
-                                      </a:solidFill>
-                                      <a:latin typeface="Cambria Math" panose="02040503050406030204" pitchFamily="18" charset="0"/>
-                                    </a:rPr>
-                                    <m:t>⋅</m:t>
-                                  </m:r>
-                                  <m:r>
-                                    <a:rPr lang="fr-FR" i="1">
-                                      <a:solidFill>
-                                        <a:schemeClr val="tx1"/>
-                                      </a:solidFill>
-                                      <a:latin typeface="Cambria Math" panose="02040503050406030204" pitchFamily="18" charset="0"/>
-                                    </a:rPr>
-                                    <m:t>𝑝𝑀𝑖𝑛</m:t>
-                                  </m:r>
-                                  <m:r>
-                                    <a:rPr lang="fr-FR" i="1">
-                                      <a:latin typeface="Cambria Math" panose="02040503050406030204" pitchFamily="18" charset="0"/>
-                                    </a:rPr>
-                                    <m:t>≤</m:t>
-                                  </m:r>
-                                  <m:r>
-                                    <a:rPr lang="fr-FR" b="0" i="1" smtClean="0">
-                                      <a:latin typeface="Cambria Math" panose="02040503050406030204" pitchFamily="18" charset="0"/>
-                                    </a:rPr>
-                                    <m:t>𝑝𝑟𝑜𝑑</m:t>
-                                  </m:r>
-                                  <m:r>
-                                    <a:rPr lang="fr-FR" i="1">
-                                      <a:latin typeface="Cambria Math" panose="02040503050406030204" pitchFamily="18" charset="0"/>
-                                    </a:rPr>
-                                    <m:t>≤</m:t>
-                                  </m:r>
-                                  <m:d>
-                                    <m:dPr>
+                                  <m:sSub>
+                                    <m:sSubPr>
                                       <m:ctrlPr>
                                         <a:rPr lang="fr-FR" i="1">
                                           <a:latin typeface="Cambria Math" panose="02040503050406030204" pitchFamily="18" charset="0"/>
                                         </a:rPr>
                                       </m:ctrlPr>
-                                    </m:dPr>
+                                    </m:sSubPr>
                                     <m:e>
-                                      <m:sSub>
-                                        <m:sSubPr>
-                                          <m:ctrlPr>
-                                            <a:rPr lang="fr-FR" i="1">
-                                              <a:latin typeface="Cambria Math" panose="02040503050406030204" pitchFamily="18" charset="0"/>
-                                            </a:rPr>
-                                          </m:ctrlPr>
-                                        </m:sSubPr>
-                                        <m:e>
-                                          <m:r>
-                                            <a:rPr lang="fr-FR" i="1">
-                                              <a:latin typeface="Cambria Math" panose="02040503050406030204" pitchFamily="18" charset="0"/>
-                                            </a:rPr>
-                                            <m:t>1−</m:t>
-                                          </m:r>
-                                          <m:r>
-                                            <a:rPr lang="fr-FR" i="1">
-                                              <a:latin typeface="Cambria Math" panose="02040503050406030204" pitchFamily="18" charset="0"/>
-                                            </a:rPr>
-                                            <m:t>𝑥</m:t>
-                                          </m:r>
-                                        </m:e>
-                                        <m:sub>
-                                          <m:r>
-                                            <a:rPr lang="fr-FR" i="1">
-                                              <a:latin typeface="Cambria Math" panose="02040503050406030204" pitchFamily="18" charset="0"/>
-                                            </a:rPr>
-                                            <m:t>𝑂𝑈𝑇</m:t>
-                                          </m:r>
-                                        </m:sub>
-                                      </m:sSub>
+                                      <m:r>
+                                        <a:rPr lang="fr-FR" i="1">
+                                          <a:latin typeface="Cambria Math" panose="02040503050406030204" pitchFamily="18" charset="0"/>
+                                        </a:rPr>
+                                        <m:t>𝑥</m:t>
+                                      </m:r>
                                     </m:e>
-                                  </m:d>
-                                  <m:r>
+                                    <m:sub>
+                                      <m:r>
+                                        <a:rPr lang="fr-FR" i="1">
+                                          <a:latin typeface="Cambria Math" panose="02040503050406030204" pitchFamily="18" charset="0"/>
+                                        </a:rPr>
+                                        <m:t>𝐼𝑁</m:t>
+                                      </m:r>
+                                    </m:sub>
+                                  </m:sSub>
+                                </m:e>
+                              </m:d>
+                              <m:r>
+                                <a:rPr lang="fr-FR" i="1">
+                                  <a:latin typeface="Cambria Math" panose="02040503050406030204" pitchFamily="18" charset="0"/>
+                                </a:rPr>
+                                <m:t>⋅</m:t>
+                              </m:r>
+                              <m:r>
+                                <a:rPr lang="fr-FR" i="1">
+                                  <a:latin typeface="Cambria Math" panose="02040503050406030204" pitchFamily="18" charset="0"/>
+                                </a:rPr>
+                                <m:t>𝑝𝑀𝑎𝑥</m:t>
+                              </m:r>
+                              <m:r>
+                                <a:rPr lang="fr-FR" i="1">
+                                  <a:latin typeface="Cambria Math" panose="02040503050406030204" pitchFamily="18" charset="0"/>
+                                </a:rPr>
+                                <m:t>≤</m:t>
+                              </m:r>
+                              <m:r>
+                                <a:rPr lang="fr-FR" b="0" i="1" smtClean="0">
+                                  <a:latin typeface="Cambria Math" panose="02040503050406030204" pitchFamily="18" charset="0"/>
+                                </a:rPr>
+                                <m:t>𝑝𝑟𝑜𝑑</m:t>
+                              </m:r>
+                              <m:r>
+                                <a:rPr lang="fr-FR" i="1">
+                                  <a:latin typeface="Cambria Math" panose="02040503050406030204" pitchFamily="18" charset="0"/>
+                                </a:rPr>
+                                <m:t>≤</m:t>
+                              </m:r>
+                              <m:d>
+                                <m:dPr>
+                                  <m:ctrlPr>
                                     <a:rPr lang="fr-FR" i="1">
                                       <a:latin typeface="Cambria Math" panose="02040503050406030204" pitchFamily="18" charset="0"/>
                                     </a:rPr>
-                                    <m:t>⋅</m:t>
-                                  </m:r>
-                                  <m:r>
-                                    <a:rPr lang="fr-FR" i="1">
-                                      <a:latin typeface="Cambria Math" panose="02040503050406030204" pitchFamily="18" charset="0"/>
-                                    </a:rPr>
-                                    <m:t>𝑝𝑀𝑎𝑥</m:t>
-                                  </m:r>
+                                  </m:ctrlPr>
+                                </m:dPr>
+                                <m:e>
+                                  <m:sSub>
+                                    <m:sSubPr>
+                                      <m:ctrlPr>
+                                        <a:rPr lang="fr-FR" i="1">
+                                          <a:latin typeface="Cambria Math" panose="02040503050406030204" pitchFamily="18" charset="0"/>
+                                        </a:rPr>
+                                      </m:ctrlPr>
+                                    </m:sSubPr>
+                                    <m:e>
+                                      <m:r>
+                                        <a:rPr lang="fr-FR" i="1">
+                                          <a:latin typeface="Cambria Math" panose="02040503050406030204" pitchFamily="18" charset="0"/>
+                                        </a:rPr>
+                                        <m:t>1−</m:t>
+                                      </m:r>
+                                      <m:r>
+                                        <a:rPr lang="fr-FR" i="1">
+                                          <a:latin typeface="Cambria Math" panose="02040503050406030204" pitchFamily="18" charset="0"/>
+                                        </a:rPr>
+                                        <m:t>𝑥</m:t>
+                                      </m:r>
+                                    </m:e>
+                                    <m:sub>
+                                      <m:r>
+                                        <a:rPr lang="fr-FR" i="1">
+                                          <a:latin typeface="Cambria Math" panose="02040503050406030204" pitchFamily="18" charset="0"/>
+                                        </a:rPr>
+                                        <m:t>𝑂𝑈𝑇</m:t>
+                                      </m:r>
+                                    </m:sub>
+                                  </m:sSub>
                                 </m:e>
-                              </m:eqArr>
+                              </m:d>
+                              <m:r>
+                                <a:rPr lang="fr-FR" i="1">
+                                  <a:latin typeface="Cambria Math" panose="02040503050406030204" pitchFamily="18" charset="0"/>
+                                </a:rPr>
+                                <m:t>⋅</m:t>
+                              </m:r>
+                              <m:r>
+                                <a:rPr lang="fr-FR" i="1">
+                                  <a:latin typeface="Cambria Math" panose="02040503050406030204" pitchFamily="18" charset="0"/>
+                                </a:rPr>
+                                <m:t>𝑝𝑀𝑎𝑥</m:t>
+                              </m:r>
                             </m:e>
                           </m:mr>
                           <m:mr>
@@ -4588,316 +4499,289 @@
                                   </m:ctrlPr>
                                 </m:eqArrPr>
                                 <m:e>
-                                  <m:eqArr>
-                                    <m:eqArrPr>
+                                  <m:sSub>
+                                    <m:sSubPr>
                                       <m:ctrlPr>
                                         <a:rPr lang="fr-FR" i="1">
                                           <a:latin typeface="Cambria Math" panose="02040503050406030204" pitchFamily="18" charset="0"/>
                                         </a:rPr>
                                       </m:ctrlPr>
-                                    </m:eqArrPr>
+                                    </m:sSubPr>
                                     <m:e>
-                                      <m:sSub>
-                                        <m:sSubPr>
-                                          <m:ctrlPr>
-                                            <a:rPr lang="fr-FR" i="1">
-                                              <a:latin typeface="Cambria Math" panose="02040503050406030204" pitchFamily="18" charset="0"/>
-                                            </a:rPr>
-                                          </m:ctrlPr>
-                                        </m:sSubPr>
-                                        <m:e>
-                                          <m:r>
-                                            <a:rPr lang="fr-FR" i="1">
-                                              <a:latin typeface="Cambria Math" panose="02040503050406030204" pitchFamily="18" charset="0"/>
-                                            </a:rPr>
-                                            <m:t>𝑥</m:t>
-                                          </m:r>
-                                        </m:e>
-                                        <m:sub>
-                                          <m:r>
-                                            <a:rPr lang="fr-FR" i="1">
-                                              <a:latin typeface="Cambria Math" panose="02040503050406030204" pitchFamily="18" charset="0"/>
-                                            </a:rPr>
-                                            <m:t>𝐼𝑁</m:t>
-                                          </m:r>
-                                        </m:sub>
-                                      </m:sSub>
                                       <m:r>
                                         <a:rPr lang="fr-FR" i="1">
                                           <a:latin typeface="Cambria Math" panose="02040503050406030204" pitchFamily="18" charset="0"/>
                                         </a:rPr>
-                                        <m:t>+</m:t>
+                                        <m:t>𝑥</m:t>
                                       </m:r>
-                                      <m:sSub>
-                                        <m:sSubPr>
-                                          <m:ctrlPr>
-                                            <a:rPr lang="fr-FR" i="1">
-                                              <a:latin typeface="Cambria Math" panose="02040503050406030204" pitchFamily="18" charset="0"/>
-                                            </a:rPr>
-                                          </m:ctrlPr>
-                                        </m:sSubPr>
-                                        <m:e>
-                                          <m:r>
-                                            <a:rPr lang="fr-FR" i="1">
-                                              <a:latin typeface="Cambria Math" panose="02040503050406030204" pitchFamily="18" charset="0"/>
-                                            </a:rPr>
-                                            <m:t>𝑥</m:t>
-                                          </m:r>
-                                        </m:e>
-                                        <m:sub>
-                                          <m:r>
-                                            <a:rPr lang="fr-FR" i="1">
-                                              <a:latin typeface="Cambria Math" panose="02040503050406030204" pitchFamily="18" charset="0"/>
-                                            </a:rPr>
-                                            <m:t>𝑀𝐴𝑅𝐺𝐼𝑁𝐴𝐿</m:t>
-                                          </m:r>
-                                        </m:sub>
-                                      </m:sSub>
+                                    </m:e>
+                                    <m:sub>
                                       <m:r>
                                         <a:rPr lang="fr-FR" i="1">
                                           <a:latin typeface="Cambria Math" panose="02040503050406030204" pitchFamily="18" charset="0"/>
                                         </a:rPr>
-                                        <m:t>+</m:t>
+                                        <m:t>𝐼𝑁</m:t>
                                       </m:r>
-                                      <m:sSub>
-                                        <m:sSubPr>
-                                          <m:ctrlPr>
-                                            <a:rPr lang="fr-FR" i="1">
-                                              <a:latin typeface="Cambria Math" panose="02040503050406030204" pitchFamily="18" charset="0"/>
-                                            </a:rPr>
-                                          </m:ctrlPr>
-                                        </m:sSubPr>
-                                        <m:e>
-                                          <m:r>
-                                            <a:rPr lang="fr-FR" i="1">
-                                              <a:latin typeface="Cambria Math" panose="02040503050406030204" pitchFamily="18" charset="0"/>
-                                            </a:rPr>
-                                            <m:t>𝑥</m:t>
-                                          </m:r>
-                                        </m:e>
-                                        <m:sub>
-                                          <m:r>
-                                            <a:rPr lang="fr-FR" i="1">
-                                              <a:latin typeface="Cambria Math" panose="02040503050406030204" pitchFamily="18" charset="0"/>
-                                            </a:rPr>
-                                            <m:t>𝑂𝑈𝑇</m:t>
-                                          </m:r>
-                                        </m:sub>
-                                      </m:sSub>
+                                    </m:sub>
+                                  </m:sSub>
+                                  <m:r>
+                                    <a:rPr lang="fr-FR" i="1">
+                                      <a:latin typeface="Cambria Math" panose="02040503050406030204" pitchFamily="18" charset="0"/>
+                                    </a:rPr>
+                                    <m:t>+</m:t>
+                                  </m:r>
+                                  <m:sSub>
+                                    <m:sSubPr>
+                                      <m:ctrlPr>
+                                        <a:rPr lang="fr-FR" i="1">
+                                          <a:latin typeface="Cambria Math" panose="02040503050406030204" pitchFamily="18" charset="0"/>
+                                        </a:rPr>
+                                      </m:ctrlPr>
+                                    </m:sSubPr>
+                                    <m:e>
                                       <m:r>
                                         <a:rPr lang="fr-FR" i="1">
                                           <a:latin typeface="Cambria Math" panose="02040503050406030204" pitchFamily="18" charset="0"/>
                                         </a:rPr>
-                                        <m:t>=1</m:t>
+                                        <m:t>𝑥</m:t>
                                       </m:r>
                                     </m:e>
-                                    <m:e>
-                                      <m:nary>
-                                        <m:naryPr>
-                                          <m:chr m:val="∑"/>
-                                          <m:subHide m:val="on"/>
-                                          <m:supHide m:val="on"/>
-                                          <m:ctrlPr>
-                                            <a:rPr lang="fr-FR" i="1">
-                                              <a:latin typeface="Cambria Math" panose="02040503050406030204" pitchFamily="18" charset="0"/>
-                                            </a:rPr>
-                                          </m:ctrlPr>
-                                        </m:naryPr>
-                                        <m:sub/>
-                                        <m:sup/>
-                                        <m:e>
-                                          <m:r>
-                                            <a:rPr lang="fr-FR" i="1">
-                                              <a:latin typeface="Cambria Math" panose="02040503050406030204" pitchFamily="18" charset="0"/>
-                                            </a:rPr>
-                                            <m:t>𝑝</m:t>
-                                          </m:r>
-                                          <m:r>
-                                            <a:rPr lang="fr-FR" b="0" i="1" smtClean="0">
-                                              <a:latin typeface="Cambria Math" panose="02040503050406030204" pitchFamily="18" charset="0"/>
-                                            </a:rPr>
-                                            <m:t>𝑟𝑜𝑑</m:t>
-                                          </m:r>
-                                        </m:e>
-                                      </m:nary>
+                                    <m:sub>
                                       <m:r>
-                                        <a:rPr lang="fr-FR" b="0" i="1" smtClean="0">
+                                        <a:rPr lang="fr-FR" i="1">
                                           <a:latin typeface="Cambria Math" panose="02040503050406030204" pitchFamily="18" charset="0"/>
                                         </a:rPr>
-                                        <m:t>≥</m:t>
+                                        <m:t>𝑀𝐴𝑅𝐺𝐼𝑁𝐴𝐿</m:t>
                                       </m:r>
-                                      <m:nary>
-                                        <m:naryPr>
-                                          <m:chr m:val="∑"/>
-                                          <m:subHide m:val="on"/>
-                                          <m:supHide m:val="on"/>
-                                          <m:ctrlPr>
-                                            <a:rPr lang="fr-FR" b="0" i="1" smtClean="0">
-                                              <a:latin typeface="Cambria Math" panose="02040503050406030204" pitchFamily="18" charset="0"/>
-                                            </a:rPr>
-                                          </m:ctrlPr>
-                                        </m:naryPr>
-                                        <m:sub/>
-                                        <m:sup/>
-                                        <m:e>
-                                          <m:r>
-                                            <a:rPr lang="fr-FR" b="0" i="1" smtClean="0">
-                                              <a:latin typeface="Cambria Math" panose="02040503050406030204" pitchFamily="18" charset="0"/>
-                                            </a:rPr>
-                                            <m:t>𝑢</m:t>
-                                          </m:r>
-                                        </m:e>
-                                      </m:nary>
-                                    </m:e>
-                                    <m:e>
-                                      <m:sSubSup>
-                                        <m:sSubSupPr>
-                                          <m:ctrlPr>
-                                            <a:rPr lang="fr-FR" i="1">
-                                              <a:latin typeface="Cambria Math" panose="02040503050406030204" pitchFamily="18" charset="0"/>
-                                            </a:rPr>
-                                          </m:ctrlPr>
-                                        </m:sSubSupPr>
-                                        <m:e>
-                                          <m:r>
-                                            <a:rPr lang="fr-FR" i="1">
-                                              <a:latin typeface="Cambria Math" panose="02040503050406030204" pitchFamily="18" charset="0"/>
-                                            </a:rPr>
-                                            <m:t>𝑥</m:t>
-                                          </m:r>
-                                        </m:e>
-                                        <m:sub>
-                                          <m:r>
-                                            <a:rPr lang="fr-FR" i="1">
-                                              <a:latin typeface="Cambria Math" panose="02040503050406030204" pitchFamily="18" charset="0"/>
-                                            </a:rPr>
-                                            <m:t>𝐼𝑁</m:t>
-                                          </m:r>
-                                        </m:sub>
-                                        <m:sup>
-                                          <m:r>
-                                            <a:rPr lang="fr-FR" i="1">
-                                              <a:latin typeface="Cambria Math" panose="02040503050406030204" pitchFamily="18" charset="0"/>
-                                            </a:rPr>
-                                            <m:t>𝑖</m:t>
-                                          </m:r>
-                                        </m:sup>
-                                      </m:sSubSup>
-                                      <m:r>
-                                        <a:rPr lang="fr-FR" b="0" i="1" smtClean="0">
+                                    </m:sub>
+                                  </m:sSub>
+                                  <m:r>
+                                    <a:rPr lang="fr-FR" i="1">
+                                      <a:latin typeface="Cambria Math" panose="02040503050406030204" pitchFamily="18" charset="0"/>
+                                    </a:rPr>
+                                    <m:t>+</m:t>
+                                  </m:r>
+                                  <m:sSub>
+                                    <m:sSubPr>
+                                      <m:ctrlPr>
+                                        <a:rPr lang="fr-FR" i="1">
                                           <a:latin typeface="Cambria Math" panose="02040503050406030204" pitchFamily="18" charset="0"/>
                                         </a:rPr>
-                                        <m:t>≤</m:t>
-                                      </m:r>
-                                      <m:sSubSup>
-                                        <m:sSubSupPr>
-                                          <m:ctrlPr>
-                                            <a:rPr lang="fr-FR" i="1">
-                                              <a:latin typeface="Cambria Math" panose="02040503050406030204" pitchFamily="18" charset="0"/>
-                                            </a:rPr>
-                                          </m:ctrlPr>
-                                        </m:sSubSupPr>
-                                        <m:e>
-                                          <m:r>
-                                            <a:rPr lang="fr-FR" i="1">
-                                              <a:latin typeface="Cambria Math" panose="02040503050406030204" pitchFamily="18" charset="0"/>
-                                            </a:rPr>
-                                            <m:t>𝑥</m:t>
-                                          </m:r>
-                                        </m:e>
-                                        <m:sub>
-                                          <m:r>
-                                            <a:rPr lang="fr-FR" i="1">
-                                              <a:latin typeface="Cambria Math" panose="02040503050406030204" pitchFamily="18" charset="0"/>
-                                            </a:rPr>
-                                            <m:t>𝐼𝑁</m:t>
-                                          </m:r>
-                                        </m:sub>
-                                        <m:sup>
-                                          <m:r>
-                                            <a:rPr lang="fr-FR" b="0" i="1" smtClean="0">
-                                              <a:latin typeface="Cambria Math" panose="02040503050406030204" pitchFamily="18" charset="0"/>
-                                            </a:rPr>
-                                            <m:t>𝑗</m:t>
-                                          </m:r>
-                                        </m:sup>
-                                      </m:sSubSup>
+                                      </m:ctrlPr>
+                                    </m:sSubPr>
+                                    <m:e>
                                       <m:r>
-                                        <a:rPr lang="fr-FR" b="0" i="1" smtClean="0">
+                                        <a:rPr lang="fr-FR" i="1">
                                           <a:latin typeface="Cambria Math" panose="02040503050406030204" pitchFamily="18" charset="0"/>
                                         </a:rPr>
-                                        <m:t> </m:t>
+                                        <m:t>𝑥</m:t>
+                                      </m:r>
+                                    </m:e>
+                                    <m:sub>
+                                      <m:r>
+                                        <a:rPr lang="fr-FR" i="1">
+                                          <a:latin typeface="Cambria Math" panose="02040503050406030204" pitchFamily="18" charset="0"/>
+                                        </a:rPr>
+                                        <m:t>𝑂𝑈𝑇</m:t>
+                                      </m:r>
+                                    </m:sub>
+                                  </m:sSub>
+                                  <m:r>
+                                    <a:rPr lang="fr-FR" i="1">
+                                      <a:latin typeface="Cambria Math" panose="02040503050406030204" pitchFamily="18" charset="0"/>
+                                    </a:rPr>
+                                    <m:t>=1</m:t>
+                                  </m:r>
+                                </m:e>
+                                <m:e>
+                                  <m:nary>
+                                    <m:naryPr>
+                                      <m:chr m:val="∑"/>
+                                      <m:subHide m:val="on"/>
+                                      <m:supHide m:val="on"/>
+                                      <m:ctrlPr>
+                                        <a:rPr lang="fr-FR" i="1">
+                                          <a:latin typeface="Cambria Math" panose="02040503050406030204" pitchFamily="18" charset="0"/>
+                                        </a:rPr>
+                                      </m:ctrlPr>
+                                    </m:naryPr>
+                                    <m:sub/>
+                                    <m:sup/>
+                                    <m:e>
+                                      <m:r>
+                                        <a:rPr lang="fr-FR" i="1">
+                                          <a:latin typeface="Cambria Math" panose="02040503050406030204" pitchFamily="18" charset="0"/>
+                                        </a:rPr>
+                                        <m:t>𝑝</m:t>
                                       </m:r>
                                       <m:r>
                                         <a:rPr lang="fr-FR" b="0" i="1" smtClean="0">
                                           <a:latin typeface="Cambria Math" panose="02040503050406030204" pitchFamily="18" charset="0"/>
                                         </a:rPr>
-                                        <m:t>𝑖𝑓</m:t>
+                                        <m:t>𝑟𝑜𝑑</m:t>
                                       </m:r>
+                                    </m:e>
+                                  </m:nary>
+                                  <m:r>
+                                    <a:rPr lang="fr-FR" i="1">
+                                      <a:latin typeface="Cambria Math" panose="02040503050406030204" pitchFamily="18" charset="0"/>
+                                    </a:rPr>
+                                    <m:t>=</m:t>
+                                  </m:r>
+                                  <m:r>
+                                    <a:rPr lang="fr-FR" i="1">
+                                      <a:latin typeface="Cambria Math" panose="02040503050406030204" pitchFamily="18" charset="0"/>
+                                    </a:rPr>
+                                    <m:t>𝑢</m:t>
+                                  </m:r>
+                                </m:e>
+                                <m:e>
+                                  <m:sSubSup>
+                                    <m:sSubSupPr>
+                                      <m:ctrlPr>
+                                        <a:rPr lang="fr-FR" i="1">
+                                          <a:latin typeface="Cambria Math" panose="02040503050406030204" pitchFamily="18" charset="0"/>
+                                        </a:rPr>
+                                      </m:ctrlPr>
+                                    </m:sSubSupPr>
+                                    <m:e>
+                                      <m:r>
+                                        <a:rPr lang="fr-FR" i="1">
+                                          <a:latin typeface="Cambria Math" panose="02040503050406030204" pitchFamily="18" charset="0"/>
+                                        </a:rPr>
+                                        <m:t>𝑥</m:t>
+                                      </m:r>
+                                    </m:e>
+                                    <m:sub>
+                                      <m:r>
+                                        <a:rPr lang="fr-FR" i="1">
+                                          <a:latin typeface="Cambria Math" panose="02040503050406030204" pitchFamily="18" charset="0"/>
+                                        </a:rPr>
+                                        <m:t>𝐼𝑁</m:t>
+                                      </m:r>
+                                    </m:sub>
+                                    <m:sup>
+                                      <m:r>
+                                        <a:rPr lang="fr-FR" i="1">
+                                          <a:latin typeface="Cambria Math" panose="02040503050406030204" pitchFamily="18" charset="0"/>
+                                        </a:rPr>
+                                        <m:t>𝑖</m:t>
+                                      </m:r>
+                                    </m:sup>
+                                  </m:sSubSup>
+                                  <m:r>
+                                    <a:rPr lang="fr-FR" b="0" i="1" smtClean="0">
+                                      <a:latin typeface="Cambria Math" panose="02040503050406030204" pitchFamily="18" charset="0"/>
+                                    </a:rPr>
+                                    <m:t>≤</m:t>
+                                  </m:r>
+                                  <m:sSubSup>
+                                    <m:sSubSupPr>
+                                      <m:ctrlPr>
+                                        <a:rPr lang="fr-FR" i="1">
+                                          <a:latin typeface="Cambria Math" panose="02040503050406030204" pitchFamily="18" charset="0"/>
+                                        </a:rPr>
+                                      </m:ctrlPr>
+                                    </m:sSubSupPr>
+                                    <m:e>
+                                      <m:r>
+                                        <a:rPr lang="fr-FR" i="1">
+                                          <a:latin typeface="Cambria Math" panose="02040503050406030204" pitchFamily="18" charset="0"/>
+                                        </a:rPr>
+                                        <m:t>𝑥</m:t>
+                                      </m:r>
+                                    </m:e>
+                                    <m:sub>
+                                      <m:r>
+                                        <a:rPr lang="fr-FR" i="1">
+                                          <a:latin typeface="Cambria Math" panose="02040503050406030204" pitchFamily="18" charset="0"/>
+                                        </a:rPr>
+                                        <m:t>𝐼𝑁</m:t>
+                                      </m:r>
+                                    </m:sub>
+                                    <m:sup>
                                       <m:r>
                                         <a:rPr lang="fr-FR" b="0" i="1" smtClean="0">
                                           <a:latin typeface="Cambria Math" panose="02040503050406030204" pitchFamily="18" charset="0"/>
                                         </a:rPr>
-                                        <m:t> </m:t>
+                                        <m:t>𝑗</m:t>
                                       </m:r>
-                                      <m:sSub>
-                                        <m:sSubPr>
-                                          <m:ctrlPr>
-                                            <a:rPr lang="fr-FR" b="0" i="1" smtClean="0">
-                                              <a:latin typeface="Cambria Math" panose="02040503050406030204" pitchFamily="18" charset="0"/>
-                                            </a:rPr>
-                                          </m:ctrlPr>
-                                        </m:sSubPr>
-                                        <m:e>
-                                          <m:r>
-                                            <a:rPr lang="fr-FR" b="0" i="1" smtClean="0">
-                                              <a:latin typeface="Cambria Math" panose="02040503050406030204" pitchFamily="18" charset="0"/>
-                                            </a:rPr>
-                                            <m:t>𝑐</m:t>
-                                          </m:r>
-                                        </m:e>
-                                        <m:sub>
-                                          <m:r>
-                                            <a:rPr lang="fr-FR" b="0" i="1" smtClean="0">
-                                              <a:latin typeface="Cambria Math" panose="02040503050406030204" pitchFamily="18" charset="0"/>
-                                            </a:rPr>
-                                            <m:t>𝑖</m:t>
-                                          </m:r>
-                                        </m:sub>
-                                      </m:sSub>
+                                    </m:sup>
+                                  </m:sSubSup>
+                                  <m:r>
+                                    <a:rPr lang="fr-FR" b="0" i="1" smtClean="0">
+                                      <a:latin typeface="Cambria Math" panose="02040503050406030204" pitchFamily="18" charset="0"/>
+                                    </a:rPr>
+                                    <m:t> </m:t>
+                                  </m:r>
+                                  <m:r>
+                                    <a:rPr lang="fr-FR" b="0" i="1" smtClean="0">
+                                      <a:latin typeface="Cambria Math" panose="02040503050406030204" pitchFamily="18" charset="0"/>
+                                    </a:rPr>
+                                    <m:t>𝑖𝑓</m:t>
+                                  </m:r>
+                                  <m:r>
+                                    <a:rPr lang="fr-FR" b="0" i="1" smtClean="0">
+                                      <a:latin typeface="Cambria Math" panose="02040503050406030204" pitchFamily="18" charset="0"/>
+                                    </a:rPr>
+                                    <m:t> </m:t>
+                                  </m:r>
+                                  <m:sSub>
+                                    <m:sSubPr>
+                                      <m:ctrlPr>
+                                        <a:rPr lang="fr-FR" b="0" i="1" smtClean="0">
+                                          <a:latin typeface="Cambria Math" panose="02040503050406030204" pitchFamily="18" charset="0"/>
+                                        </a:rPr>
+                                      </m:ctrlPr>
+                                    </m:sSubPr>
+                                    <m:e>
                                       <m:r>
                                         <a:rPr lang="fr-FR" b="0" i="1" smtClean="0">
                                           <a:latin typeface="Cambria Math" panose="02040503050406030204" pitchFamily="18" charset="0"/>
                                         </a:rPr>
-                                        <m:t>≥</m:t>
+                                        <m:t>𝑐</m:t>
                                       </m:r>
-                                      <m:sSub>
-                                        <m:sSubPr>
-                                          <m:ctrlPr>
-                                            <a:rPr lang="fr-FR" b="0" i="1" smtClean="0">
-                                              <a:latin typeface="Cambria Math" panose="02040503050406030204" pitchFamily="18" charset="0"/>
-                                            </a:rPr>
-                                          </m:ctrlPr>
-                                        </m:sSubPr>
-                                        <m:e>
-                                          <m:r>
-                                            <a:rPr lang="fr-FR" b="0" i="1" smtClean="0">
-                                              <a:latin typeface="Cambria Math" panose="02040503050406030204" pitchFamily="18" charset="0"/>
-                                            </a:rPr>
-                                            <m:t>𝑐</m:t>
-                                          </m:r>
-                                        </m:e>
-                                        <m:sub>
-                                          <m:r>
-                                            <a:rPr lang="fr-FR" b="0" i="1" smtClean="0">
-                                              <a:latin typeface="Cambria Math" panose="02040503050406030204" pitchFamily="18" charset="0"/>
-                                            </a:rPr>
-                                            <m:t>𝑗</m:t>
-                                          </m:r>
-                                        </m:sub>
-                                      </m:sSub>
                                     </m:e>
-                                  </m:eqArr>
+                                    <m:sub>
+                                      <m:r>
+                                        <a:rPr lang="fr-FR" b="0" i="1" smtClean="0">
+                                          <a:latin typeface="Cambria Math" panose="02040503050406030204" pitchFamily="18" charset="0"/>
+                                        </a:rPr>
+                                        <m:t>𝑖</m:t>
+                                      </m:r>
+                                    </m:sub>
+                                  </m:sSub>
+                                  <m:r>
+                                    <a:rPr lang="fr-FR" b="0" i="1" smtClean="0">
+                                      <a:latin typeface="Cambria Math" panose="02040503050406030204" pitchFamily="18" charset="0"/>
+                                    </a:rPr>
+                                    <m:t>≥</m:t>
+                                  </m:r>
+                                  <m:sSub>
+                                    <m:sSubPr>
+                                      <m:ctrlPr>
+                                        <a:rPr lang="fr-FR" b="0" i="1" smtClean="0">
+                                          <a:latin typeface="Cambria Math" panose="02040503050406030204" pitchFamily="18" charset="0"/>
+                                        </a:rPr>
+                                      </m:ctrlPr>
+                                    </m:sSubPr>
+                                    <m:e>
+                                      <m:r>
+                                        <a:rPr lang="fr-FR" b="0" i="1" smtClean="0">
+                                          <a:latin typeface="Cambria Math" panose="02040503050406030204" pitchFamily="18" charset="0"/>
+                                        </a:rPr>
+                                        <m:t>𝑐</m:t>
+                                      </m:r>
+                                    </m:e>
+                                    <m:sub>
+                                      <m:r>
+                                        <a:rPr lang="fr-FR" b="0" i="1" smtClean="0">
+                                          <a:latin typeface="Cambria Math" panose="02040503050406030204" pitchFamily="18" charset="0"/>
+                                        </a:rPr>
+                                        <m:t>𝑗</m:t>
+                                      </m:r>
+                                    </m:sub>
+                                  </m:sSub>
                                 </m:e>
                               </m:eqArr>
                             </m:e>
@@ -4935,7 +4819,7 @@
                       <a:rPr lang="fr-FR" i="1">
                         <a:latin typeface="Cambria Math" panose="02040503050406030204" pitchFamily="18" charset="0"/>
                       </a:rPr>
-                      <m:t>𝑝𝑟𝑜𝑑</m:t>
+                      <m:t>𝑝</m:t>
                     </m:r>
                     <m:r>
                       <a:rPr lang="fr-FR" i="1">
@@ -5028,7 +4912,7 @@
                               <a:rPr lang="fr-FR" b="0" i="1" smtClean="0">
                                 <a:latin typeface="Cambria Math" panose="02040503050406030204" pitchFamily="18" charset="0"/>
                               </a:rPr>
-                              <m:t>≤</m:t>
+                              <m:t>−</m:t>
                             </m:r>
                             <m:r>
                               <a:rPr lang="fr-FR" b="0" i="1" smtClean="0">
@@ -5040,16 +4924,8 @@
                               <a:rPr lang="fr-FR" b="0" i="1" smtClean="0">
                                 <a:latin typeface="Cambria Math" panose="02040503050406030204" pitchFamily="18" charset="0"/>
                               </a:rPr>
-                              <m:t>+</m:t>
+                              <m:t>−</m:t>
                             </m:r>
-                            <m:r>
-                              <a:rPr lang="fr-FR" b="0" i="1" smtClean="0">
-                                <a:latin typeface="Cambria Math" panose="02040503050406030204" pitchFamily="18" charset="0"/>
-                              </a:rPr>
-                              <m:t>𝜌</m:t>
-                            </m:r>
-                          </m:e>
-                          <m:e>
                             <m:r>
                               <a:rPr lang="fr-FR" b="0" i="1" smtClean="0">
                                 <a:latin typeface="Cambria Math" panose="02040503050406030204" pitchFamily="18" charset="0"/>
@@ -5060,9 +4936,10 @@
                               <a:rPr lang="fr-FR" b="0" i="1" smtClean="0">
                                 <a:latin typeface="Cambria Math" panose="02040503050406030204" pitchFamily="18" charset="0"/>
                               </a:rPr>
-                              <m:t>≥0</m:t>
+                              <m:t>≤0</m:t>
                             </m:r>
                           </m:e>
+                          <m:e/>
                           <m:e/>
                         </m:eqArr>
                       </m:e>

</xml_diff>